<commit_message>
Update Dag in survival context
</commit_message>
<xml_diff>
--- a/images/DAG.pptx
+++ b/images/DAG.pptx
@@ -244,7 +244,7 @@
           <a:p>
             <a:fld id="{B030A541-3F6B-42FD-9C8E-FEC9C25F1663}" type="datetimeFigureOut">
               <a:rPr lang="en-US" smtClean="0"/>
-              <a:t>10/10/2025</a:t>
+              <a:t>10/13/2025</a:t>
             </a:fld>
             <a:endParaRPr lang="en-US"/>
           </a:p>
@@ -414,7 +414,7 @@
           <a:p>
             <a:fld id="{B030A541-3F6B-42FD-9C8E-FEC9C25F1663}" type="datetimeFigureOut">
               <a:rPr lang="en-US" smtClean="0"/>
-              <a:t>10/10/2025</a:t>
+              <a:t>10/13/2025</a:t>
             </a:fld>
             <a:endParaRPr lang="en-US"/>
           </a:p>
@@ -594,7 +594,7 @@
           <a:p>
             <a:fld id="{B030A541-3F6B-42FD-9C8E-FEC9C25F1663}" type="datetimeFigureOut">
               <a:rPr lang="en-US" smtClean="0"/>
-              <a:t>10/10/2025</a:t>
+              <a:t>10/13/2025</a:t>
             </a:fld>
             <a:endParaRPr lang="en-US"/>
           </a:p>
@@ -764,7 +764,7 @@
           <a:p>
             <a:fld id="{B030A541-3F6B-42FD-9C8E-FEC9C25F1663}" type="datetimeFigureOut">
               <a:rPr lang="en-US" smtClean="0"/>
-              <a:t>10/10/2025</a:t>
+              <a:t>10/13/2025</a:t>
             </a:fld>
             <a:endParaRPr lang="en-US"/>
           </a:p>
@@ -1010,7 +1010,7 @@
           <a:p>
             <a:fld id="{B030A541-3F6B-42FD-9C8E-FEC9C25F1663}" type="datetimeFigureOut">
               <a:rPr lang="en-US" smtClean="0"/>
-              <a:t>10/10/2025</a:t>
+              <a:t>10/13/2025</a:t>
             </a:fld>
             <a:endParaRPr lang="en-US"/>
           </a:p>
@@ -1242,7 +1242,7 @@
           <a:p>
             <a:fld id="{B030A541-3F6B-42FD-9C8E-FEC9C25F1663}" type="datetimeFigureOut">
               <a:rPr lang="en-US" smtClean="0"/>
-              <a:t>10/10/2025</a:t>
+              <a:t>10/13/2025</a:t>
             </a:fld>
             <a:endParaRPr lang="en-US"/>
           </a:p>
@@ -1609,7 +1609,7 @@
           <a:p>
             <a:fld id="{B030A541-3F6B-42FD-9C8E-FEC9C25F1663}" type="datetimeFigureOut">
               <a:rPr lang="en-US" smtClean="0"/>
-              <a:t>10/10/2025</a:t>
+              <a:t>10/13/2025</a:t>
             </a:fld>
             <a:endParaRPr lang="en-US"/>
           </a:p>
@@ -1727,7 +1727,7 @@
           <a:p>
             <a:fld id="{B030A541-3F6B-42FD-9C8E-FEC9C25F1663}" type="datetimeFigureOut">
               <a:rPr lang="en-US" smtClean="0"/>
-              <a:t>10/10/2025</a:t>
+              <a:t>10/13/2025</a:t>
             </a:fld>
             <a:endParaRPr lang="en-US"/>
           </a:p>
@@ -1822,7 +1822,7 @@
           <a:p>
             <a:fld id="{B030A541-3F6B-42FD-9C8E-FEC9C25F1663}" type="datetimeFigureOut">
               <a:rPr lang="en-US" smtClean="0"/>
-              <a:t>10/10/2025</a:t>
+              <a:t>10/13/2025</a:t>
             </a:fld>
             <a:endParaRPr lang="en-US"/>
           </a:p>
@@ -2099,7 +2099,7 @@
           <a:p>
             <a:fld id="{B030A541-3F6B-42FD-9C8E-FEC9C25F1663}" type="datetimeFigureOut">
               <a:rPr lang="en-US" smtClean="0"/>
-              <a:t>10/10/2025</a:t>
+              <a:t>10/13/2025</a:t>
             </a:fld>
             <a:endParaRPr lang="en-US"/>
           </a:p>
@@ -2352,7 +2352,7 @@
           <a:p>
             <a:fld id="{B030A541-3F6B-42FD-9C8E-FEC9C25F1663}" type="datetimeFigureOut">
               <a:rPr lang="en-US" smtClean="0"/>
-              <a:t>10/10/2025</a:t>
+              <a:t>10/13/2025</a:t>
             </a:fld>
             <a:endParaRPr lang="en-US"/>
           </a:p>
@@ -2565,7 +2565,7 @@
           <a:p>
             <a:fld id="{B030A541-3F6B-42FD-9C8E-FEC9C25F1663}" type="datetimeFigureOut">
               <a:rPr lang="en-US" smtClean="0"/>
-              <a:t>10/10/2025</a:t>
+              <a:t>10/13/2025</a:t>
             </a:fld>
             <a:endParaRPr lang="en-US"/>
           </a:p>
@@ -6428,7 +6428,7 @@
             <a:r>
               <a:rPr lang="fr-FR" dirty="0" err="1" smtClean="0">
                 <a:solidFill>
-                  <a:schemeClr val="accent4">
+                  <a:schemeClr val="accent2">
                     <a:lumMod val="75000"/>
                   </a:schemeClr>
                 </a:solidFill>
@@ -6438,7 +6438,7 @@
             <a:r>
               <a:rPr lang="fr-FR" dirty="0" smtClean="0">
                 <a:solidFill>
-                  <a:schemeClr val="accent4">
+                  <a:schemeClr val="accent2">
                     <a:lumMod val="75000"/>
                   </a:schemeClr>
                 </a:solidFill>
@@ -6447,7 +6447,7 @@
             </a:r>
             <a:endParaRPr lang="en-US" dirty="0">
               <a:solidFill>
-                <a:schemeClr val="accent4">
+                <a:schemeClr val="accent2">
                   <a:lumMod val="75000"/>
                 </a:schemeClr>
               </a:solidFill>
@@ -6518,7 +6518,7 @@
             <a:r>
               <a:rPr lang="fr-FR" dirty="0" err="1" smtClean="0">
                 <a:solidFill>
-                  <a:schemeClr val="accent4">
+                  <a:schemeClr val="accent2">
                     <a:lumMod val="75000"/>
                   </a:schemeClr>
                 </a:solidFill>
@@ -6528,7 +6528,7 @@
             <a:r>
               <a:rPr lang="fr-FR" dirty="0" smtClean="0">
                 <a:solidFill>
-                  <a:schemeClr val="accent4">
+                  <a:schemeClr val="accent2">
                     <a:lumMod val="75000"/>
                   </a:schemeClr>
                 </a:solidFill>
@@ -6537,7 +6537,7 @@
             </a:r>
             <a:endParaRPr lang="en-US" dirty="0">
               <a:solidFill>
-                <a:schemeClr val="accent4">
+                <a:schemeClr val="accent2">
                   <a:lumMod val="75000"/>
                 </a:schemeClr>
               </a:solidFill>
@@ -6570,7 +6570,7 @@
             <a:r>
               <a:rPr lang="fr-FR" dirty="0" err="1" smtClean="0">
                 <a:solidFill>
-                  <a:schemeClr val="accent4">
+                  <a:schemeClr val="accent2">
                     <a:lumMod val="75000"/>
                   </a:schemeClr>
                 </a:solidFill>
@@ -6580,7 +6580,7 @@
             <a:r>
               <a:rPr lang="fr-FR" dirty="0" smtClean="0">
                 <a:solidFill>
-                  <a:schemeClr val="accent4">
+                  <a:schemeClr val="accent2">
                     <a:lumMod val="75000"/>
                   </a:schemeClr>
                 </a:solidFill>
@@ -6589,7 +6589,7 @@
             </a:r>
             <a:endParaRPr lang="en-US" dirty="0">
               <a:solidFill>
-                <a:schemeClr val="accent4">
+                <a:schemeClr val="accent2">
                   <a:lumMod val="75000"/>
                 </a:schemeClr>
               </a:solidFill>

</xml_diff>